<commit_message>
Se agrego la parte de Julio al Word y PPT
</commit_message>
<xml_diff>
--- a/Git_Laboratorio.pptx
+++ b/Git_Laboratorio.pptx
@@ -19,22 +19,22 @@
     <p:sldId id="264" r:id="rId13"/>
     <p:sldId id="265" r:id="rId14"/>
     <p:sldId id="267" r:id="rId15"/>
-    <p:sldId id="268" r:id="rId16"/>
-    <p:sldId id="269" r:id="rId17"/>
-    <p:sldId id="270" r:id="rId18"/>
-    <p:sldId id="271" r:id="rId19"/>
-    <p:sldId id="272" r:id="rId20"/>
-    <p:sldId id="273" r:id="rId21"/>
-    <p:sldId id="275" r:id="rId22"/>
-    <p:sldId id="276" r:id="rId23"/>
-    <p:sldId id="277" r:id="rId24"/>
-    <p:sldId id="278" r:id="rId25"/>
-    <p:sldId id="279" r:id="rId26"/>
-    <p:sldId id="280" r:id="rId27"/>
-    <p:sldId id="281" r:id="rId28"/>
-    <p:sldId id="282" r:id="rId29"/>
-    <p:sldId id="287" r:id="rId30"/>
-    <p:sldId id="289" r:id="rId31"/>
+    <p:sldId id="354" r:id="rId16"/>
+    <p:sldId id="355" r:id="rId17"/>
+    <p:sldId id="356" r:id="rId18"/>
+    <p:sldId id="357" r:id="rId19"/>
+    <p:sldId id="358" r:id="rId20"/>
+    <p:sldId id="359" r:id="rId21"/>
+    <p:sldId id="360" r:id="rId22"/>
+    <p:sldId id="361" r:id="rId23"/>
+    <p:sldId id="362" r:id="rId24"/>
+    <p:sldId id="363" r:id="rId25"/>
+    <p:sldId id="364" r:id="rId26"/>
+    <p:sldId id="365" r:id="rId27"/>
+    <p:sldId id="366" r:id="rId28"/>
+    <p:sldId id="367" r:id="rId29"/>
+    <p:sldId id="368" r:id="rId30"/>
+    <p:sldId id="369" r:id="rId31"/>
     <p:sldId id="290" r:id="rId32"/>
     <p:sldId id="291" r:id="rId33"/>
     <p:sldId id="292" r:id="rId34"/>
@@ -365,7 +365,7 @@
           <a:p>
             <a:fld id="{7D4B79B9-FC1E-40D4-A411-4835B57B4850}" type="datetimeFigureOut">
               <a:rPr lang="es-ES" smtClean="0"/>
-              <a:t>08/07/2016</a:t>
+              <a:t>08/08/2016</a:t>
             </a:fld>
             <a:endParaRPr lang="es-ES"/>
           </a:p>
@@ -663,7 +663,7 @@
           <a:p>
             <a:fld id="{7D4B79B9-FC1E-40D4-A411-4835B57B4850}" type="datetimeFigureOut">
               <a:rPr lang="es-ES" smtClean="0"/>
-              <a:t>08/07/2016</a:t>
+              <a:t>08/08/2016</a:t>
             </a:fld>
             <a:endParaRPr lang="es-ES"/>
           </a:p>
@@ -855,7 +855,7 @@
           <a:p>
             <a:fld id="{7D4B79B9-FC1E-40D4-A411-4835B57B4850}" type="datetimeFigureOut">
               <a:rPr lang="es-ES" smtClean="0"/>
-              <a:t>08/07/2016</a:t>
+              <a:t>08/08/2016</a:t>
             </a:fld>
             <a:endParaRPr lang="es-ES"/>
           </a:p>
@@ -1116,7 +1116,7 @@
           <a:p>
             <a:fld id="{7D4B79B9-FC1E-40D4-A411-4835B57B4850}" type="datetimeFigureOut">
               <a:rPr lang="es-ES" smtClean="0"/>
-              <a:t>08/07/2016</a:t>
+              <a:t>08/08/2016</a:t>
             </a:fld>
             <a:endParaRPr lang="es-ES"/>
           </a:p>
@@ -1540,7 +1540,7 @@
           <a:p>
             <a:fld id="{7D4B79B9-FC1E-40D4-A411-4835B57B4850}" type="datetimeFigureOut">
               <a:rPr lang="es-ES" smtClean="0"/>
-              <a:t>08/07/2016</a:t>
+              <a:t>08/08/2016</a:t>
             </a:fld>
             <a:endParaRPr lang="es-ES"/>
           </a:p>
@@ -2077,7 +2077,7 @@
           <a:p>
             <a:fld id="{7D4B79B9-FC1E-40D4-A411-4835B57B4850}" type="datetimeFigureOut">
               <a:rPr lang="es-ES" smtClean="0"/>
-              <a:t>08/07/2016</a:t>
+              <a:t>08/08/2016</a:t>
             </a:fld>
             <a:endParaRPr lang="es-ES"/>
           </a:p>
@@ -2941,7 +2941,7 @@
           <a:p>
             <a:fld id="{7D4B79B9-FC1E-40D4-A411-4835B57B4850}" type="datetimeFigureOut">
               <a:rPr lang="es-ES" smtClean="0"/>
-              <a:t>08/07/2016</a:t>
+              <a:t>08/08/2016</a:t>
             </a:fld>
             <a:endParaRPr lang="es-ES"/>
           </a:p>
@@ -3111,7 +3111,7 @@
           <a:p>
             <a:fld id="{7D4B79B9-FC1E-40D4-A411-4835B57B4850}" type="datetimeFigureOut">
               <a:rPr lang="es-ES" smtClean="0"/>
-              <a:t>08/07/2016</a:t>
+              <a:t>08/08/2016</a:t>
             </a:fld>
             <a:endParaRPr lang="es-ES"/>
           </a:p>
@@ -3295,7 +3295,7 @@
           <a:p>
             <a:fld id="{7D4B79B9-FC1E-40D4-A411-4835B57B4850}" type="datetimeFigureOut">
               <a:rPr lang="es-ES" smtClean="0"/>
-              <a:t>08/07/2016</a:t>
+              <a:t>08/08/2016</a:t>
             </a:fld>
             <a:endParaRPr lang="es-ES"/>
           </a:p>
@@ -3465,7 +3465,7 @@
           <a:p>
             <a:fld id="{7D4B79B9-FC1E-40D4-A411-4835B57B4850}" type="datetimeFigureOut">
               <a:rPr lang="es-ES" smtClean="0"/>
-              <a:t>08/07/2016</a:t>
+              <a:t>08/08/2016</a:t>
             </a:fld>
             <a:endParaRPr lang="es-ES"/>
           </a:p>
@@ -3709,7 +3709,7 @@
           <a:p>
             <a:fld id="{7D4B79B9-FC1E-40D4-A411-4835B57B4850}" type="datetimeFigureOut">
               <a:rPr lang="es-ES" smtClean="0"/>
-              <a:t>08/07/2016</a:t>
+              <a:t>08/08/2016</a:t>
             </a:fld>
             <a:endParaRPr lang="es-ES"/>
           </a:p>
@@ -3945,7 +3945,7 @@
           <a:p>
             <a:fld id="{7D4B79B9-FC1E-40D4-A411-4835B57B4850}" type="datetimeFigureOut">
               <a:rPr lang="es-ES" smtClean="0"/>
-              <a:t>08/07/2016</a:t>
+              <a:t>08/08/2016</a:t>
             </a:fld>
             <a:endParaRPr lang="es-ES"/>
           </a:p>
@@ -4411,7 +4411,7 @@
           <a:p>
             <a:fld id="{7D4B79B9-FC1E-40D4-A411-4835B57B4850}" type="datetimeFigureOut">
               <a:rPr lang="es-ES" smtClean="0"/>
-              <a:t>08/07/2016</a:t>
+              <a:t>08/08/2016</a:t>
             </a:fld>
             <a:endParaRPr lang="es-ES"/>
           </a:p>
@@ -4529,7 +4529,7 @@
           <a:p>
             <a:fld id="{7D4B79B9-FC1E-40D4-A411-4835B57B4850}" type="datetimeFigureOut">
               <a:rPr lang="es-ES" smtClean="0"/>
-              <a:t>08/07/2016</a:t>
+              <a:t>08/08/2016</a:t>
             </a:fld>
             <a:endParaRPr lang="es-ES"/>
           </a:p>
@@ -4624,7 +4624,7 @@
           <a:p>
             <a:fld id="{7D4B79B9-FC1E-40D4-A411-4835B57B4850}" type="datetimeFigureOut">
               <a:rPr lang="es-ES" smtClean="0"/>
-              <a:t>08/07/2016</a:t>
+              <a:t>08/08/2016</a:t>
             </a:fld>
             <a:endParaRPr lang="es-ES"/>
           </a:p>
@@ -4879,7 +4879,7 @@
           <a:p>
             <a:fld id="{7D4B79B9-FC1E-40D4-A411-4835B57B4850}" type="datetimeFigureOut">
               <a:rPr lang="es-ES" smtClean="0"/>
-              <a:t>08/07/2016</a:t>
+              <a:t>08/08/2016</a:t>
             </a:fld>
             <a:endParaRPr lang="es-ES"/>
           </a:p>
@@ -5179,7 +5179,7 @@
           <a:p>
             <a:fld id="{7D4B79B9-FC1E-40D4-A411-4835B57B4850}" type="datetimeFigureOut">
               <a:rPr lang="es-ES" smtClean="0"/>
-              <a:t>08/07/2016</a:t>
+              <a:t>08/08/2016</a:t>
             </a:fld>
             <a:endParaRPr lang="es-ES"/>
           </a:p>
@@ -5413,7 +5413,7 @@
           <a:p>
             <a:fld id="{7D4B79B9-FC1E-40D4-A411-4835B57B4850}" type="datetimeFigureOut">
               <a:rPr lang="es-ES" smtClean="0"/>
-              <a:t>08/07/2016</a:t>
+              <a:t>08/08/2016</a:t>
             </a:fld>
             <a:endParaRPr lang="es-ES"/>
           </a:p>
@@ -7829,11 +7829,21 @@
           <a:p>
             <a:r>
               <a:rPr lang="es-419" sz="6600" b="1" dirty="0" smtClean="0">
+                <a:solidFill>
+                  <a:schemeClr val="accent4">
+                    <a:lumMod val="75000"/>
+                  </a:schemeClr>
+                </a:solidFill>
                 <a:latin typeface="Hel"/>
               </a:rPr>
               <a:t>Primeros pasos</a:t>
             </a:r>
             <a:endParaRPr lang="es-ES" sz="6600" b="1" dirty="0">
+              <a:solidFill>
+                <a:schemeClr val="accent4">
+                  <a:lumMod val="75000"/>
+                </a:schemeClr>
+              </a:solidFill>
               <a:latin typeface="Hel"/>
             </a:endParaRPr>
           </a:p>
@@ -7872,7 +7882,7 @@
     </p:spTree>
     <p:extLst>
       <p:ext uri="{BB962C8B-B14F-4D97-AF65-F5344CB8AC3E}">
-        <p14:creationId xmlns:p14="http://schemas.microsoft.com/office/powerpoint/2010/main" val="2756586695"/>
+        <p14:creationId xmlns:p14="http://schemas.microsoft.com/office/powerpoint/2010/main" val="241708108"/>
       </p:ext>
     </p:extLst>
   </p:cSld>
@@ -7944,7 +7954,7 @@
             <a:r>
               <a:rPr lang="es-419" sz="6600" b="1" dirty="0" smtClean="0">
                 <a:solidFill>
-                  <a:schemeClr val="accent6">
+                  <a:schemeClr val="accent4">
                     <a:lumMod val="75000"/>
                   </a:schemeClr>
                 </a:solidFill>
@@ -7954,7 +7964,7 @@
             </a:r>
             <a:endParaRPr lang="es-ES" sz="6600" b="1" dirty="0">
               <a:solidFill>
-                <a:schemeClr val="accent6">
+                <a:schemeClr val="accent4">
                   <a:lumMod val="75000"/>
                 </a:schemeClr>
               </a:solidFill>
@@ -7966,7 +7976,7 @@
     </p:spTree>
     <p:extLst>
       <p:ext uri="{BB962C8B-B14F-4D97-AF65-F5344CB8AC3E}">
-        <p14:creationId xmlns:p14="http://schemas.microsoft.com/office/powerpoint/2010/main" val="1154440257"/>
+        <p14:creationId xmlns:p14="http://schemas.microsoft.com/office/powerpoint/2010/main" val="223260388"/>
       </p:ext>
     </p:extLst>
   </p:cSld>
@@ -8096,7 +8106,7 @@
     </p:spTree>
     <p:extLst>
       <p:ext uri="{BB962C8B-B14F-4D97-AF65-F5344CB8AC3E}">
-        <p14:creationId xmlns:p14="http://schemas.microsoft.com/office/powerpoint/2010/main" val="854753013"/>
+        <p14:creationId xmlns:p14="http://schemas.microsoft.com/office/powerpoint/2010/main" val="3506086471"/>
       </p:ext>
     </p:extLst>
   </p:cSld>
@@ -8159,7 +8169,7 @@
             <a:r>
               <a:rPr lang="es-419" sz="6600" b="1" dirty="0" smtClean="0">
                 <a:solidFill>
-                  <a:schemeClr val="accent6">
+                  <a:schemeClr val="accent4">
                     <a:lumMod val="75000"/>
                   </a:schemeClr>
                 </a:solidFill>
@@ -8169,7 +8179,7 @@
             </a:r>
             <a:endParaRPr lang="es-ES" sz="6600" b="1" dirty="0">
               <a:solidFill>
-                <a:schemeClr val="accent6">
+                <a:schemeClr val="accent4">
                   <a:lumMod val="75000"/>
                 </a:schemeClr>
               </a:solidFill>
@@ -8181,7 +8191,7 @@
     </p:spTree>
     <p:extLst>
       <p:ext uri="{BB962C8B-B14F-4D97-AF65-F5344CB8AC3E}">
-        <p14:creationId xmlns:p14="http://schemas.microsoft.com/office/powerpoint/2010/main" val="2999550067"/>
+        <p14:creationId xmlns:p14="http://schemas.microsoft.com/office/powerpoint/2010/main" val="4293255911"/>
       </p:ext>
     </p:extLst>
   </p:cSld>
@@ -8291,8 +8301,8 @@
             <a:r>
               <a:rPr lang="es-ES" sz="4400" b="1" dirty="0">
                 <a:solidFill>
-                  <a:schemeClr val="tx2">
-                    <a:lumMod val="50000"/>
+                  <a:schemeClr val="accent4">
+                    <a:lumMod val="75000"/>
                   </a:schemeClr>
                 </a:solidFill>
                 <a:latin typeface="Hel"/>
@@ -8301,8 +8311,8 @@
             </a:r>
             <a:endParaRPr lang="es-ES" sz="4400" dirty="0">
               <a:solidFill>
-                <a:schemeClr val="tx2">
-                  <a:lumMod val="50000"/>
+                <a:schemeClr val="accent4">
+                  <a:lumMod val="75000"/>
                 </a:schemeClr>
               </a:solidFill>
               <a:latin typeface="Hel"/>
@@ -8410,7 +8420,7 @@
     </p:spTree>
     <p:extLst>
       <p:ext uri="{BB962C8B-B14F-4D97-AF65-F5344CB8AC3E}">
-        <p14:creationId xmlns:p14="http://schemas.microsoft.com/office/powerpoint/2010/main" val="2156702136"/>
+        <p14:creationId xmlns:p14="http://schemas.microsoft.com/office/powerpoint/2010/main" val="3122441254"/>
       </p:ext>
     </p:extLst>
   </p:cSld>
@@ -9186,8 +9196,8 @@
             <a:r>
               <a:rPr lang="es-ES" sz="4400" b="1" dirty="0">
                 <a:solidFill>
-                  <a:schemeClr val="tx2">
-                    <a:lumMod val="50000"/>
+                  <a:schemeClr val="accent4">
+                    <a:lumMod val="75000"/>
                   </a:schemeClr>
                 </a:solidFill>
                 <a:latin typeface="Hel"/>
@@ -9197,8 +9207,8 @@
             <a:r>
               <a:rPr lang="es-ES" sz="4400" b="1" dirty="0" smtClean="0">
                 <a:solidFill>
-                  <a:schemeClr val="tx2">
-                    <a:lumMod val="50000"/>
+                  <a:schemeClr val="accent4">
+                    <a:lumMod val="75000"/>
                   </a:schemeClr>
                 </a:solidFill>
                 <a:latin typeface="Hel"/>
@@ -9207,8 +9217,8 @@
             </a:r>
             <a:endParaRPr lang="es-ES" sz="4400" dirty="0">
               <a:solidFill>
-                <a:schemeClr val="tx2">
-                  <a:lumMod val="50000"/>
+                <a:schemeClr val="accent4">
+                  <a:lumMod val="75000"/>
                 </a:schemeClr>
               </a:solidFill>
               <a:latin typeface="Hel"/>
@@ -9371,7 +9381,7 @@
     </p:spTree>
     <p:extLst>
       <p:ext uri="{BB962C8B-B14F-4D97-AF65-F5344CB8AC3E}">
-        <p14:creationId xmlns:p14="http://schemas.microsoft.com/office/powerpoint/2010/main" val="854642149"/>
+        <p14:creationId xmlns:p14="http://schemas.microsoft.com/office/powerpoint/2010/main" val="3489512570"/>
       </p:ext>
     </p:extLst>
   </p:cSld>
@@ -9433,8 +9443,8 @@
             <a:r>
               <a:rPr lang="es-ES" sz="4400" b="1" dirty="0" smtClean="0">
                 <a:solidFill>
-                  <a:schemeClr val="tx2">
-                    <a:lumMod val="50000"/>
+                  <a:schemeClr val="accent4">
+                    <a:lumMod val="75000"/>
                   </a:schemeClr>
                 </a:solidFill>
                 <a:latin typeface="Hel"/>
@@ -9443,8 +9453,8 @@
             </a:r>
             <a:endParaRPr lang="es-ES" sz="4400" dirty="0">
               <a:solidFill>
-                <a:schemeClr val="tx2">
-                  <a:lumMod val="50000"/>
+                <a:schemeClr val="accent4">
+                  <a:lumMod val="75000"/>
                 </a:schemeClr>
               </a:solidFill>
               <a:latin typeface="Hel"/>
@@ -9587,7 +9597,7 @@
     </p:spTree>
     <p:extLst>
       <p:ext uri="{BB962C8B-B14F-4D97-AF65-F5344CB8AC3E}">
-        <p14:creationId xmlns:p14="http://schemas.microsoft.com/office/powerpoint/2010/main" val="4033659674"/>
+        <p14:creationId xmlns:p14="http://schemas.microsoft.com/office/powerpoint/2010/main" val="3581097896"/>
       </p:ext>
     </p:extLst>
   </p:cSld>
@@ -9648,11 +9658,21 @@
           <a:p>
             <a:r>
               <a:rPr lang="es-419" sz="6600" b="1" dirty="0" smtClean="0">
+                <a:solidFill>
+                  <a:schemeClr val="accent4">
+                    <a:lumMod val="75000"/>
+                  </a:schemeClr>
+                </a:solidFill>
                 <a:latin typeface="Hel"/>
               </a:rPr>
               <a:t>Nuestro primer proyecto</a:t>
             </a:r>
             <a:endParaRPr lang="es-ES" sz="6600" b="1" dirty="0">
+              <a:solidFill>
+                <a:schemeClr val="accent4">
+                  <a:lumMod val="75000"/>
+                </a:schemeClr>
+              </a:solidFill>
               <a:latin typeface="Hel"/>
             </a:endParaRPr>
           </a:p>
@@ -9691,7 +9711,7 @@
     </p:spTree>
     <p:extLst>
       <p:ext uri="{BB962C8B-B14F-4D97-AF65-F5344CB8AC3E}">
-        <p14:creationId xmlns:p14="http://schemas.microsoft.com/office/powerpoint/2010/main" val="3066890791"/>
+        <p14:creationId xmlns:p14="http://schemas.microsoft.com/office/powerpoint/2010/main" val="1556623040"/>
       </p:ext>
     </p:extLst>
   </p:cSld>
@@ -9851,7 +9871,7 @@
     </p:spTree>
     <p:extLst>
       <p:ext uri="{BB962C8B-B14F-4D97-AF65-F5344CB8AC3E}">
-        <p14:creationId xmlns:p14="http://schemas.microsoft.com/office/powerpoint/2010/main" val="837931497"/>
+        <p14:creationId xmlns:p14="http://schemas.microsoft.com/office/powerpoint/2010/main" val="1344273802"/>
       </p:ext>
     </p:extLst>
   </p:cSld>
@@ -10011,7 +10031,7 @@
     </p:spTree>
     <p:extLst>
       <p:ext uri="{BB962C8B-B14F-4D97-AF65-F5344CB8AC3E}">
-        <p14:creationId xmlns:p14="http://schemas.microsoft.com/office/powerpoint/2010/main" val="3244233353"/>
+        <p14:creationId xmlns:p14="http://schemas.microsoft.com/office/powerpoint/2010/main" val="2054478722"/>
       </p:ext>
     </p:extLst>
   </p:cSld>
@@ -10347,7 +10367,7 @@
     </p:spTree>
     <p:extLst>
       <p:ext uri="{BB962C8B-B14F-4D97-AF65-F5344CB8AC3E}">
-        <p14:creationId xmlns:p14="http://schemas.microsoft.com/office/powerpoint/2010/main" val="3117479394"/>
+        <p14:creationId xmlns:p14="http://schemas.microsoft.com/office/powerpoint/2010/main" val="3656077977"/>
       </p:ext>
     </p:extLst>
   </p:cSld>
@@ -10578,7 +10598,7 @@
     </p:spTree>
     <p:extLst>
       <p:ext uri="{BB962C8B-B14F-4D97-AF65-F5344CB8AC3E}">
-        <p14:creationId xmlns:p14="http://schemas.microsoft.com/office/powerpoint/2010/main" val="588831323"/>
+        <p14:creationId xmlns:p14="http://schemas.microsoft.com/office/powerpoint/2010/main" val="4135280577"/>
       </p:ext>
     </p:extLst>
   </p:cSld>
@@ -10943,7 +10963,7 @@
     </p:spTree>
     <p:extLst>
       <p:ext uri="{BB962C8B-B14F-4D97-AF65-F5344CB8AC3E}">
-        <p14:creationId xmlns:p14="http://schemas.microsoft.com/office/powerpoint/2010/main" val="546258175"/>
+        <p14:creationId xmlns:p14="http://schemas.microsoft.com/office/powerpoint/2010/main" val="4172016195"/>
       </p:ext>
     </p:extLst>
   </p:cSld>
@@ -11347,7 +11367,7 @@
     </p:spTree>
     <p:extLst>
       <p:ext uri="{BB962C8B-B14F-4D97-AF65-F5344CB8AC3E}">
-        <p14:creationId xmlns:p14="http://schemas.microsoft.com/office/powerpoint/2010/main" val="3412343469"/>
+        <p14:creationId xmlns:p14="http://schemas.microsoft.com/office/powerpoint/2010/main" val="3484700890"/>
       </p:ext>
     </p:extLst>
   </p:cSld>
@@ -11516,7 +11536,7 @@
     </p:spTree>
     <p:extLst>
       <p:ext uri="{BB962C8B-B14F-4D97-AF65-F5344CB8AC3E}">
-        <p14:creationId xmlns:p14="http://schemas.microsoft.com/office/powerpoint/2010/main" val="3476625431"/>
+        <p14:creationId xmlns:p14="http://schemas.microsoft.com/office/powerpoint/2010/main" val="3062185717"/>
       </p:ext>
     </p:extLst>
   </p:cSld>
@@ -11844,7 +11864,7 @@
     </p:spTree>
     <p:extLst>
       <p:ext uri="{BB962C8B-B14F-4D97-AF65-F5344CB8AC3E}">
-        <p14:creationId xmlns:p14="http://schemas.microsoft.com/office/powerpoint/2010/main" val="1381577550"/>
+        <p14:creationId xmlns:p14="http://schemas.microsoft.com/office/powerpoint/2010/main" val="721021772"/>
       </p:ext>
     </p:extLst>
   </p:cSld>
@@ -11945,13 +11965,13 @@
   <p:clrMapOvr>
     <a:masterClrMapping/>
   </p:clrMapOvr>
-  <mc:AlternateContent xmlns:mc="http://schemas.openxmlformats.org/markup-compatibility/2006">
-    <mc:Choice xmlns:p14="http://schemas.microsoft.com/office/powerpoint/2010/main" Requires="p14">
+  <mc:AlternateContent xmlns:mc="http://schemas.openxmlformats.org/markup-compatibility/2006" xmlns:p14="http://schemas.microsoft.com/office/powerpoint/2010/main">
+    <mc:Choice Requires="p14">
       <p:transition spd="slow" p14:dur="2000">
         <p:wipe/>
       </p:transition>
     </mc:Choice>
-    <mc:Fallback>
+    <mc:Fallback xmlns="">
       <p:transition spd="slow">
         <p:wipe/>
       </p:transition>
@@ -12518,13 +12538,13 @@
   <p:clrMapOvr>
     <a:masterClrMapping/>
   </p:clrMapOvr>
-  <mc:AlternateContent xmlns:mc="http://schemas.openxmlformats.org/markup-compatibility/2006">
-    <mc:Choice xmlns:p14="http://schemas.microsoft.com/office/powerpoint/2010/main" Requires="p14">
+  <mc:AlternateContent xmlns:mc="http://schemas.openxmlformats.org/markup-compatibility/2006" xmlns:p14="http://schemas.microsoft.com/office/powerpoint/2010/main">
+    <mc:Choice Requires="p14">
       <p:transition spd="slow" p14:dur="2000">
         <p:wipe/>
       </p:transition>
     </mc:Choice>
-    <mc:Fallback>
+    <mc:Fallback xmlns="">
       <p:transition spd="slow">
         <p:wipe/>
       </p:transition>
@@ -13602,13 +13622,13 @@
   <p:clrMapOvr>
     <a:masterClrMapping/>
   </p:clrMapOvr>
-  <mc:AlternateContent xmlns:mc="http://schemas.openxmlformats.org/markup-compatibility/2006">
-    <mc:Choice xmlns:p14="http://schemas.microsoft.com/office/powerpoint/2010/main" Requires="p14">
+  <mc:AlternateContent xmlns:mc="http://schemas.openxmlformats.org/markup-compatibility/2006" xmlns:p14="http://schemas.microsoft.com/office/powerpoint/2010/main">
+    <mc:Choice Requires="p14">
       <p:transition spd="slow" p14:dur="2000">
         <p:wipe/>
       </p:transition>
     </mc:Choice>
-    <mc:Fallback>
+    <mc:Fallback xmlns="">
       <p:transition spd="slow">
         <p:wipe/>
       </p:transition>
@@ -14414,18 +14434,7 @@
                 </a:solidFill>
                 <a:latin typeface="Hel"/>
               </a:rPr>
-              <a:t>Eliminando </a:t>
-            </a:r>
-            <a:r>
-              <a:rPr lang="es-419" sz="6600" b="1" dirty="0" smtClean="0">
-                <a:solidFill>
-                  <a:schemeClr val="accent4">
-                    <a:lumMod val="75000"/>
-                  </a:schemeClr>
-                </a:solidFill>
-                <a:latin typeface="Hel"/>
-              </a:rPr>
-              <a:t>Ramas</a:t>
+              <a:t>Eliminando Ramas</a:t>
             </a:r>
             <a:endParaRPr lang="es-ES" sz="6600" b="1" dirty="0">
               <a:solidFill>
@@ -14448,13 +14457,13 @@
   <p:clrMapOvr>
     <a:masterClrMapping/>
   </p:clrMapOvr>
-  <mc:AlternateContent xmlns:mc="http://schemas.openxmlformats.org/markup-compatibility/2006">
-    <mc:Choice xmlns:p14="http://schemas.microsoft.com/office/powerpoint/2010/main" Requires="p14">
+  <mc:AlternateContent xmlns:mc="http://schemas.openxmlformats.org/markup-compatibility/2006" xmlns:p14="http://schemas.microsoft.com/office/powerpoint/2010/main">
+    <mc:Choice Requires="p14">
       <p:transition spd="slow" p14:dur="2000">
         <p:wipe/>
       </p:transition>
     </mc:Choice>
-    <mc:Fallback>
+    <mc:Fallback xmlns="">
       <p:transition spd="slow">
         <p:wipe/>
       </p:transition>

</xml_diff>